<commit_message>
Finalize data-viz-01 for R users group
</commit_message>
<xml_diff>
--- a/data-viz-01/component/change-shape.pptx
+++ b/data-viz-01/component/change-shape.pptx
@@ -3143,7 +3143,15 @@
             </a:r>
             <a:r>
               <a:rPr/>
-              <a:t>ATTR(Bedrooms).</a:t>
+              <a:t>Dimension</a:t>
+            </a:r>
+            <a:r>
+              <a:rPr/>
+              <a:t> </a:t>
+            </a:r>
+            <a:r>
+              <a:rPr/>
+              <a:t>Categorical.</a:t>
             </a:r>
           </a:p>
         </p:txBody>
@@ -6513,7 +6521,7 @@
               <a:rPr sz="1800">
                 <a:latin typeface="Courier"/>
               </a:rPr>
-              <a:t>ch5 = alt.Chart(df).mark_point().encode(
+              <a:t>ch = alt.Chart(df).mark_point().encode(
       x='Age',y='Price', shape='Bedrooms:N')</a:t>
             </a:r>
           </a:p>

</xml_diff>